<commit_message>
Update lecture 2 materials
</commit_message>
<xml_diff>
--- a/lectures/lec-02-academic-fair.pptx
+++ b/lectures/lec-02-academic-fair.pptx
@@ -6,6 +6,7 @@
   </p:sldMasterIdLst>
   <p:sldIdLst>
     <p:sldId id="256" r:id="rId2"/>
+    <p:sldId id="257" r:id="rId3"/>
   </p:sldIdLst>
   <p:sldSz cx="12192000" cy="6858000"/>
   <p:notesSz cx="6858000" cy="9144000"/>
@@ -104,6 +105,11 @@
       </a:defRPr>
     </a:lvl9pPr>
   </p:defaultTextStyle>
+  <p:extLst>
+    <p:ext uri="{EFAFB233-063F-42B5-8137-9DF3F51BA10A}">
+      <p15:sldGuideLst xmlns:p15="http://schemas.microsoft.com/office/powerpoint/2012/main"/>
+    </p:ext>
+  </p:extLst>
 </p:presentation>
 </file>
 
@@ -254,7 +260,7 @@
           <a:p>
             <a:fld id="{D6195860-BFB7-0747-8B40-30F5EBF1F142}" type="datetimeFigureOut">
               <a:rPr lang="en-US" smtClean="0"/>
-              <a:t>9/3/24</a:t>
+              <a:t>9/4/24</a:t>
             </a:fld>
             <a:endParaRPr lang="en-US"/>
           </a:p>
@@ -324,6 +330,18 @@
   <p:clrMapOvr>
     <a:masterClrMapping/>
   </p:clrMapOvr>
+  <mc:AlternateContent xmlns:mc="http://schemas.openxmlformats.org/markup-compatibility/2006">
+    <mc:Choice xmlns:p14="http://schemas.microsoft.com/office/powerpoint/2010/main" Requires="p14">
+      <p:transition spd="med" p14:dur="700" advClick="0" advTm="30000">
+        <p:fade/>
+      </p:transition>
+    </mc:Choice>
+    <mc:Fallback>
+      <p:transition spd="med" advClick="0" advTm="30000">
+        <p:fade/>
+      </p:transition>
+    </mc:Fallback>
+  </mc:AlternateContent>
 </p:sldLayout>
 </file>
 
@@ -452,7 +470,7 @@
           <a:p>
             <a:fld id="{D6195860-BFB7-0747-8B40-30F5EBF1F142}" type="datetimeFigureOut">
               <a:rPr lang="en-US" smtClean="0"/>
-              <a:t>9/3/24</a:t>
+              <a:t>9/4/24</a:t>
             </a:fld>
             <a:endParaRPr lang="en-US"/>
           </a:p>
@@ -522,6 +540,18 @@
   <p:clrMapOvr>
     <a:masterClrMapping/>
   </p:clrMapOvr>
+  <mc:AlternateContent xmlns:mc="http://schemas.openxmlformats.org/markup-compatibility/2006">
+    <mc:Choice xmlns:p14="http://schemas.microsoft.com/office/powerpoint/2010/main" Requires="p14">
+      <p:transition spd="med" p14:dur="700" advClick="0" advTm="30000">
+        <p:fade/>
+      </p:transition>
+    </mc:Choice>
+    <mc:Fallback>
+      <p:transition spd="med" advClick="0" advTm="30000">
+        <p:fade/>
+      </p:transition>
+    </mc:Fallback>
+  </mc:AlternateContent>
 </p:sldLayout>
 </file>
 
@@ -660,7 +690,7 @@
           <a:p>
             <a:fld id="{D6195860-BFB7-0747-8B40-30F5EBF1F142}" type="datetimeFigureOut">
               <a:rPr lang="en-US" smtClean="0"/>
-              <a:t>9/3/24</a:t>
+              <a:t>9/4/24</a:t>
             </a:fld>
             <a:endParaRPr lang="en-US"/>
           </a:p>
@@ -730,6 +760,18 @@
   <p:clrMapOvr>
     <a:masterClrMapping/>
   </p:clrMapOvr>
+  <mc:AlternateContent xmlns:mc="http://schemas.openxmlformats.org/markup-compatibility/2006">
+    <mc:Choice xmlns:p14="http://schemas.microsoft.com/office/powerpoint/2010/main" Requires="p14">
+      <p:transition spd="med" p14:dur="700" advClick="0" advTm="30000">
+        <p:fade/>
+      </p:transition>
+    </mc:Choice>
+    <mc:Fallback>
+      <p:transition spd="med" advClick="0" advTm="30000">
+        <p:fade/>
+      </p:transition>
+    </mc:Fallback>
+  </mc:AlternateContent>
 </p:sldLayout>
 </file>
 
@@ -858,7 +900,7 @@
           <a:p>
             <a:fld id="{D6195860-BFB7-0747-8B40-30F5EBF1F142}" type="datetimeFigureOut">
               <a:rPr lang="en-US" smtClean="0"/>
-              <a:t>9/3/24</a:t>
+              <a:t>9/4/24</a:t>
             </a:fld>
             <a:endParaRPr lang="en-US"/>
           </a:p>
@@ -928,6 +970,18 @@
   <p:clrMapOvr>
     <a:masterClrMapping/>
   </p:clrMapOvr>
+  <mc:AlternateContent xmlns:mc="http://schemas.openxmlformats.org/markup-compatibility/2006">
+    <mc:Choice xmlns:p14="http://schemas.microsoft.com/office/powerpoint/2010/main" Requires="p14">
+      <p:transition spd="med" p14:dur="700" advClick="0" advTm="30000">
+        <p:fade/>
+      </p:transition>
+    </mc:Choice>
+    <mc:Fallback>
+      <p:transition spd="med" advClick="0" advTm="30000">
+        <p:fade/>
+      </p:transition>
+    </mc:Fallback>
+  </mc:AlternateContent>
 </p:sldLayout>
 </file>
 
@@ -1133,7 +1187,7 @@
           <a:p>
             <a:fld id="{D6195860-BFB7-0747-8B40-30F5EBF1F142}" type="datetimeFigureOut">
               <a:rPr lang="en-US" smtClean="0"/>
-              <a:t>9/3/24</a:t>
+              <a:t>9/4/24</a:t>
             </a:fld>
             <a:endParaRPr lang="en-US"/>
           </a:p>
@@ -1203,6 +1257,18 @@
   <p:clrMapOvr>
     <a:masterClrMapping/>
   </p:clrMapOvr>
+  <mc:AlternateContent xmlns:mc="http://schemas.openxmlformats.org/markup-compatibility/2006">
+    <mc:Choice xmlns:p14="http://schemas.microsoft.com/office/powerpoint/2010/main" Requires="p14">
+      <p:transition spd="med" p14:dur="700" advClick="0" advTm="30000">
+        <p:fade/>
+      </p:transition>
+    </mc:Choice>
+    <mc:Fallback>
+      <p:transition spd="med" advClick="0" advTm="30000">
+        <p:fade/>
+      </p:transition>
+    </mc:Fallback>
+  </mc:AlternateContent>
 </p:sldLayout>
 </file>
 
@@ -1398,7 +1464,7 @@
           <a:p>
             <a:fld id="{D6195860-BFB7-0747-8B40-30F5EBF1F142}" type="datetimeFigureOut">
               <a:rPr lang="en-US" smtClean="0"/>
-              <a:t>9/3/24</a:t>
+              <a:t>9/4/24</a:t>
             </a:fld>
             <a:endParaRPr lang="en-US"/>
           </a:p>
@@ -1468,6 +1534,18 @@
   <p:clrMapOvr>
     <a:masterClrMapping/>
   </p:clrMapOvr>
+  <mc:AlternateContent xmlns:mc="http://schemas.openxmlformats.org/markup-compatibility/2006">
+    <mc:Choice xmlns:p14="http://schemas.microsoft.com/office/powerpoint/2010/main" Requires="p14">
+      <p:transition spd="med" p14:dur="700" advClick="0" advTm="30000">
+        <p:fade/>
+      </p:transition>
+    </mc:Choice>
+    <mc:Fallback>
+      <p:transition spd="med" advClick="0" advTm="30000">
+        <p:fade/>
+      </p:transition>
+    </mc:Fallback>
+  </mc:AlternateContent>
 </p:sldLayout>
 </file>
 
@@ -1810,7 +1888,7 @@
           <a:p>
             <a:fld id="{D6195860-BFB7-0747-8B40-30F5EBF1F142}" type="datetimeFigureOut">
               <a:rPr lang="en-US" smtClean="0"/>
-              <a:t>9/3/24</a:t>
+              <a:t>9/4/24</a:t>
             </a:fld>
             <a:endParaRPr lang="en-US"/>
           </a:p>
@@ -1880,6 +1958,18 @@
   <p:clrMapOvr>
     <a:masterClrMapping/>
   </p:clrMapOvr>
+  <mc:AlternateContent xmlns:mc="http://schemas.openxmlformats.org/markup-compatibility/2006">
+    <mc:Choice xmlns:p14="http://schemas.microsoft.com/office/powerpoint/2010/main" Requires="p14">
+      <p:transition spd="med" p14:dur="700" advClick="0" advTm="30000">
+        <p:fade/>
+      </p:transition>
+    </mc:Choice>
+    <mc:Fallback>
+      <p:transition spd="med" advClick="0" advTm="30000">
+        <p:fade/>
+      </p:transition>
+    </mc:Fallback>
+  </mc:AlternateContent>
 </p:sldLayout>
 </file>
 
@@ -1951,7 +2041,7 @@
           <a:p>
             <a:fld id="{D6195860-BFB7-0747-8B40-30F5EBF1F142}" type="datetimeFigureOut">
               <a:rPr lang="en-US" smtClean="0"/>
-              <a:t>9/3/24</a:t>
+              <a:t>9/4/24</a:t>
             </a:fld>
             <a:endParaRPr lang="en-US"/>
           </a:p>
@@ -2021,6 +2111,18 @@
   <p:clrMapOvr>
     <a:masterClrMapping/>
   </p:clrMapOvr>
+  <mc:AlternateContent xmlns:mc="http://schemas.openxmlformats.org/markup-compatibility/2006">
+    <mc:Choice xmlns:p14="http://schemas.microsoft.com/office/powerpoint/2010/main" Requires="p14">
+      <p:transition spd="med" p14:dur="700" advClick="0" advTm="30000">
+        <p:fade/>
+      </p:transition>
+    </mc:Choice>
+    <mc:Fallback>
+      <p:transition spd="med" advClick="0" advTm="30000">
+        <p:fade/>
+      </p:transition>
+    </mc:Fallback>
+  </mc:AlternateContent>
 </p:sldLayout>
 </file>
 
@@ -2064,7 +2166,7 @@
           <a:p>
             <a:fld id="{D6195860-BFB7-0747-8B40-30F5EBF1F142}" type="datetimeFigureOut">
               <a:rPr lang="en-US" smtClean="0"/>
-              <a:t>9/3/24</a:t>
+              <a:t>9/4/24</a:t>
             </a:fld>
             <a:endParaRPr lang="en-US"/>
           </a:p>
@@ -2134,6 +2236,18 @@
   <p:clrMapOvr>
     <a:masterClrMapping/>
   </p:clrMapOvr>
+  <mc:AlternateContent xmlns:mc="http://schemas.openxmlformats.org/markup-compatibility/2006">
+    <mc:Choice xmlns:p14="http://schemas.microsoft.com/office/powerpoint/2010/main" Requires="p14">
+      <p:transition spd="med" p14:dur="700" advClick="0" advTm="30000">
+        <p:fade/>
+      </p:transition>
+    </mc:Choice>
+    <mc:Fallback>
+      <p:transition spd="med" advClick="0" advTm="30000">
+        <p:fade/>
+      </p:transition>
+    </mc:Fallback>
+  </mc:AlternateContent>
 </p:sldLayout>
 </file>
 
@@ -2375,7 +2489,7 @@
           <a:p>
             <a:fld id="{D6195860-BFB7-0747-8B40-30F5EBF1F142}" type="datetimeFigureOut">
               <a:rPr lang="en-US" smtClean="0"/>
-              <a:t>9/3/24</a:t>
+              <a:t>9/4/24</a:t>
             </a:fld>
             <a:endParaRPr lang="en-US"/>
           </a:p>
@@ -2445,6 +2559,18 @@
   <p:clrMapOvr>
     <a:masterClrMapping/>
   </p:clrMapOvr>
+  <mc:AlternateContent xmlns:mc="http://schemas.openxmlformats.org/markup-compatibility/2006">
+    <mc:Choice xmlns:p14="http://schemas.microsoft.com/office/powerpoint/2010/main" Requires="p14">
+      <p:transition spd="med" p14:dur="700" advClick="0" advTm="30000">
+        <p:fade/>
+      </p:transition>
+    </mc:Choice>
+    <mc:Fallback>
+      <p:transition spd="med" advClick="0" advTm="30000">
+        <p:fade/>
+      </p:transition>
+    </mc:Fallback>
+  </mc:AlternateContent>
 </p:sldLayout>
 </file>
 
@@ -2663,7 +2789,7 @@
           <a:p>
             <a:fld id="{D6195860-BFB7-0747-8B40-30F5EBF1F142}" type="datetimeFigureOut">
               <a:rPr lang="en-US" smtClean="0"/>
-              <a:t>9/3/24</a:t>
+              <a:t>9/4/24</a:t>
             </a:fld>
             <a:endParaRPr lang="en-US"/>
           </a:p>
@@ -2733,6 +2859,18 @@
   <p:clrMapOvr>
     <a:masterClrMapping/>
   </p:clrMapOvr>
+  <mc:AlternateContent xmlns:mc="http://schemas.openxmlformats.org/markup-compatibility/2006">
+    <mc:Choice xmlns:p14="http://schemas.microsoft.com/office/powerpoint/2010/main" Requires="p14">
+      <p:transition spd="med" p14:dur="700" advClick="0" advTm="30000">
+        <p:fade/>
+      </p:transition>
+    </mc:Choice>
+    <mc:Fallback>
+      <p:transition spd="med" advClick="0" advTm="30000">
+        <p:fade/>
+      </p:transition>
+    </mc:Fallback>
+  </mc:AlternateContent>
 </p:sldLayout>
 </file>
 
@@ -2904,7 +3042,7 @@
           <a:p>
             <a:fld id="{D6195860-BFB7-0747-8B40-30F5EBF1F142}" type="datetimeFigureOut">
               <a:rPr lang="en-US" smtClean="0"/>
-              <a:t>9/3/24</a:t>
+              <a:t>9/4/24</a:t>
             </a:fld>
             <a:endParaRPr lang="en-US"/>
           </a:p>
@@ -3021,6 +3159,18 @@
     <p:sldLayoutId id="2147483658" r:id="rId10"/>
     <p:sldLayoutId id="2147483659" r:id="rId11"/>
   </p:sldLayoutIdLst>
+  <mc:AlternateContent xmlns:mc="http://schemas.openxmlformats.org/markup-compatibility/2006">
+    <mc:Choice xmlns:p14="http://schemas.microsoft.com/office/powerpoint/2010/main" Requires="p14">
+      <p:transition spd="med" p14:dur="700" advClick="0" advTm="30000">
+        <p:fade/>
+      </p:transition>
+    </mc:Choice>
+    <mc:Fallback>
+      <p:transition spd="med" advClick="0" advTm="30000">
+        <p:fade/>
+      </p:transition>
+    </mc:Fallback>
+  </mc:AlternateContent>
   <p:txStyles>
     <p:titleStyle>
       <a:lvl1pPr algn="l" defTabSz="914400" rtl="0" eaLnBrk="1" latinLnBrk="0" hangingPunct="1">
@@ -3361,6 +3511,277 @@
   <p:clrMapOvr>
     <a:masterClrMapping/>
   </p:clrMapOvr>
+  <mc:AlternateContent xmlns:mc="http://schemas.openxmlformats.org/markup-compatibility/2006">
+    <mc:Choice xmlns:p14="http://schemas.microsoft.com/office/powerpoint/2010/main" Requires="p14">
+      <p:transition spd="med" p14:dur="700" advClick="0" advTm="30000">
+        <p:fade/>
+      </p:transition>
+    </mc:Choice>
+    <mc:Fallback>
+      <p:transition spd="med" advClick="0" advTm="30000">
+        <p:fade/>
+      </p:transition>
+    </mc:Fallback>
+  </mc:AlternateContent>
+</p:sld>
+</file>
+
+<file path=ppt/slides/slide2.xml><?xml version="1.0" encoding="utf-8"?>
+<p:sld xmlns:a="http://schemas.openxmlformats.org/drawingml/2006/main" xmlns:r="http://schemas.openxmlformats.org/officeDocument/2006/relationships" xmlns:p="http://schemas.openxmlformats.org/presentationml/2006/main">
+  <p:cSld>
+    <p:bg>
+      <p:bgPr>
+        <a:solidFill>
+          <a:schemeClr val="bg1"/>
+        </a:solidFill>
+        <a:effectLst/>
+      </p:bgPr>
+    </p:bg>
+    <p:spTree>
+      <p:nvGrpSpPr>
+        <p:cNvPr id="1" name=""/>
+        <p:cNvGrpSpPr/>
+        <p:nvPr/>
+      </p:nvGrpSpPr>
+      <p:grpSpPr>
+        <a:xfrm>
+          <a:off x="0" y="0"/>
+          <a:ext cx="0" cy="0"/>
+          <a:chOff x="0" y="0"/>
+          <a:chExt cx="0" cy="0"/>
+        </a:xfrm>
+      </p:grpSpPr>
+      <p:sp>
+        <p:nvSpPr>
+          <p:cNvPr id="10" name="Rectangle 9">
+            <a:extLst>
+              <a:ext uri="{FF2B5EF4-FFF2-40B4-BE49-F238E27FC236}">
+                <a16:creationId xmlns:a16="http://schemas.microsoft.com/office/drawing/2014/main" id="{5E7AA7E8-8006-4E1F-A566-FCF37EE6F35D}"/>
+              </a:ext>
+              <a:ext uri="{C183D7F6-B498-43B3-948B-1728B52AA6E4}">
+                <adec:decorative xmlns:adec="http://schemas.microsoft.com/office/drawing/2017/decorative" val="1"/>
+              </a:ext>
+            </a:extLst>
+          </p:cNvPr>
+          <p:cNvSpPr>
+            <a:spLocks noGrp="1" noRot="1" noChangeAspect="1" noMove="1" noResize="1" noEditPoints="1" noAdjustHandles="1" noChangeArrowheads="1" noChangeShapeType="1" noTextEdit="1"/>
+          </p:cNvSpPr>
+          <p:nvPr>
+            <p:extLst>
+              <p:ext uri="{386F3935-93C4-4BCD-93E2-E3B085C9AB24}">
+                <p16:designElem xmlns:p16="http://schemas.microsoft.com/office/powerpoint/2015/main" val="1"/>
+              </p:ext>
+            </p:extLst>
+          </p:nvPr>
+        </p:nvSpPr>
+        <p:spPr>
+          <a:xfrm>
+            <a:off x="0" y="0"/>
+            <a:ext cx="12192000" cy="6858000"/>
+          </a:xfrm>
+          <a:prstGeom prst="rect">
+            <a:avLst/>
+          </a:prstGeom>
+          <a:gradFill flip="none" rotWithShape="1">
+            <a:gsLst>
+              <a:gs pos="0">
+                <a:schemeClr val="accent1"/>
+              </a:gs>
+              <a:gs pos="100000">
+                <a:schemeClr val="accent2"/>
+              </a:gs>
+            </a:gsLst>
+            <a:lin ang="2700000" scaled="1"/>
+            <a:tileRect/>
+          </a:gradFill>
+          <a:ln>
+            <a:noFill/>
+          </a:ln>
+        </p:spPr>
+        <p:style>
+          <a:lnRef idx="2">
+            <a:schemeClr val="accent1">
+              <a:shade val="50000"/>
+            </a:schemeClr>
+          </a:lnRef>
+          <a:fillRef idx="1">
+            <a:schemeClr val="accent1"/>
+          </a:fillRef>
+          <a:effectRef idx="0">
+            <a:schemeClr val="accent1"/>
+          </a:effectRef>
+          <a:fontRef idx="minor">
+            <a:schemeClr val="lt1"/>
+          </a:fontRef>
+        </p:style>
+        <p:txBody>
+          <a:bodyPr rtlCol="0" anchor="ctr"/>
+          <a:lstStyle/>
+          <a:p>
+            <a:pPr algn="ctr"/>
+            <a:endParaRPr lang="en-US">
+              <a:solidFill>
+                <a:srgbClr val="FFFFFF"/>
+              </a:solidFill>
+            </a:endParaRPr>
+          </a:p>
+        </p:txBody>
+      </p:sp>
+      <p:sp>
+        <p:nvSpPr>
+          <p:cNvPr id="4" name="Title 3">
+            <a:extLst>
+              <a:ext uri="{FF2B5EF4-FFF2-40B4-BE49-F238E27FC236}">
+                <a16:creationId xmlns:a16="http://schemas.microsoft.com/office/drawing/2014/main" id="{FBCDF193-79ED-F698-DF9B-C4315BC90F62}"/>
+              </a:ext>
+            </a:extLst>
+          </p:cNvPr>
+          <p:cNvSpPr>
+            <a:spLocks noGrp="1"/>
+          </p:cNvSpPr>
+          <p:nvPr>
+            <p:ph type="ctrTitle"/>
+          </p:nvPr>
+        </p:nvSpPr>
+        <p:spPr>
+          <a:xfrm>
+            <a:off x="242910" y="1598246"/>
+            <a:ext cx="4626709" cy="5122985"/>
+          </a:xfrm>
+        </p:spPr>
+        <p:txBody>
+          <a:bodyPr anchor="t">
+            <a:normAutofit/>
+          </a:bodyPr>
+          <a:lstStyle/>
+          <a:p>
+            <a:pPr algn="r"/>
+            <a:r>
+              <a:rPr lang="en-US" sz="8000" dirty="0">
+                <a:solidFill>
+                  <a:srgbClr val="FFFFFF"/>
+                </a:solidFill>
+              </a:rPr>
+              <a:t>Go to section on Fridays</a:t>
+            </a:r>
+          </a:p>
+        </p:txBody>
+      </p:sp>
+      <p:sp>
+        <p:nvSpPr>
+          <p:cNvPr id="5" name="Subtitle 4">
+            <a:extLst>
+              <a:ext uri="{FF2B5EF4-FFF2-40B4-BE49-F238E27FC236}">
+                <a16:creationId xmlns:a16="http://schemas.microsoft.com/office/drawing/2014/main" id="{216BD284-70DA-1B61-2B63-9435C10083A1}"/>
+              </a:ext>
+            </a:extLst>
+          </p:cNvPr>
+          <p:cNvSpPr>
+            <a:spLocks noGrp="1"/>
+          </p:cNvSpPr>
+          <p:nvPr>
+            <p:ph type="subTitle" idx="1"/>
+          </p:nvPr>
+        </p:nvSpPr>
+        <p:spPr>
+          <a:xfrm>
+            <a:off x="5792994" y="1590840"/>
+            <a:ext cx="5672176" cy="5095221"/>
+          </a:xfrm>
+        </p:spPr>
+        <p:txBody>
+          <a:bodyPr>
+            <a:normAutofit/>
+          </a:bodyPr>
+          <a:lstStyle/>
+          <a:p>
+            <a:pPr algn="l"/>
+            <a:r>
+              <a:rPr lang="en-US" sz="4400" dirty="0">
+                <a:solidFill>
+                  <a:srgbClr val="FFFFFF"/>
+                </a:solidFill>
+              </a:rPr>
+              <a:t>Or you will fail the course</a:t>
+            </a:r>
+          </a:p>
+        </p:txBody>
+      </p:sp>
+      <p:cxnSp>
+        <p:nvCxnSpPr>
+          <p:cNvPr id="12" name="Straight Connector 11">
+            <a:extLst>
+              <a:ext uri="{FF2B5EF4-FFF2-40B4-BE49-F238E27FC236}">
+                <a16:creationId xmlns:a16="http://schemas.microsoft.com/office/drawing/2014/main" id="{56020367-4FD5-4596-8E10-C5F095CD8DBF}"/>
+              </a:ext>
+              <a:ext uri="{C183D7F6-B498-43B3-948B-1728B52AA6E4}">
+                <adec:decorative xmlns:adec="http://schemas.microsoft.com/office/drawing/2017/decorative" val="1"/>
+              </a:ext>
+            </a:extLst>
+          </p:cNvPr>
+          <p:cNvCxnSpPr>
+            <a:cxnSpLocks noGrp="1" noRot="1" noChangeAspect="1" noMove="1" noResize="1" noEditPoints="1" noAdjustHandles="1" noChangeArrowheads="1" noChangeShapeType="1"/>
+          </p:cNvCxnSpPr>
+          <p:nvPr>
+            <p:extLst>
+              <p:ext uri="{386F3935-93C4-4BCD-93E2-E3B085C9AB24}">
+                <p16:designElem xmlns:p16="http://schemas.microsoft.com/office/powerpoint/2015/main" val="1"/>
+              </p:ext>
+            </p:extLst>
+          </p:nvPr>
+        </p:nvCxnSpPr>
+        <p:spPr>
+          <a:xfrm>
+            <a:off x="5447322" y="1589368"/>
+            <a:ext cx="0" cy="5259754"/>
+          </a:xfrm>
+          <a:prstGeom prst="line">
+            <a:avLst/>
+          </a:prstGeom>
+          <a:ln w="25400" cap="sq">
+            <a:solidFill>
+              <a:srgbClr val="FFFFFF"/>
+            </a:solidFill>
+            <a:bevel/>
+          </a:ln>
+        </p:spPr>
+        <p:style>
+          <a:lnRef idx="1">
+            <a:schemeClr val="accent1"/>
+          </a:lnRef>
+          <a:fillRef idx="0">
+            <a:schemeClr val="accent1"/>
+          </a:fillRef>
+          <a:effectRef idx="0">
+            <a:schemeClr val="accent1"/>
+          </a:effectRef>
+          <a:fontRef idx="minor">
+            <a:schemeClr val="tx1"/>
+          </a:fontRef>
+        </p:style>
+      </p:cxnSp>
+    </p:spTree>
+    <p:extLst>
+      <p:ext uri="{BB962C8B-B14F-4D97-AF65-F5344CB8AC3E}">
+        <p14:creationId xmlns:p14="http://schemas.microsoft.com/office/powerpoint/2010/main" val="2717799834"/>
+      </p:ext>
+    </p:extLst>
+  </p:cSld>
+  <p:clrMapOvr>
+    <a:masterClrMapping/>
+  </p:clrMapOvr>
+  <mc:AlternateContent xmlns:mc="http://schemas.openxmlformats.org/markup-compatibility/2006">
+    <mc:Choice xmlns:p14="http://schemas.microsoft.com/office/powerpoint/2010/main" Requires="p14">
+      <p:transition spd="med" p14:dur="700" advClick="0" advTm="30000">
+        <p:fade/>
+      </p:transition>
+    </mc:Choice>
+    <mc:Fallback>
+      <p:transition spd="med" advClick="0" advTm="30000">
+        <p:fade/>
+      </p:transition>
+    </mc:Fallback>
+  </mc:AlternateContent>
 </p:sld>
 </file>
 

</xml_diff>